<commit_message>
/ ‘ostfix/add-MX-record.txt’ / ‘ostfix/email_best_practices.pdf’ / ‘ostfix/emailbestpractices.pptx’ / ‘ostfix/mailwatch_setup.txt’
</commit_message>
<xml_diff>
--- a/postfix/emailbestpractices.pptx
+++ b/postfix/emailbestpractices.pptx
@@ -259,7 +259,7 @@
           <a:p>
             <a:fld id="{0FCFF65A-1B82-EC42-8471-385BCA80589D}" type="datetimeFigureOut">
               <a:rPr lang="en-US" smtClean="0"/>
-              <a:t>4/30/18</a:t>
+              <a:t>5/2/18</a:t>
             </a:fld>
             <a:endParaRPr lang="en-US"/>
           </a:p>
@@ -427,7 +427,7 @@
           <a:p>
             <a:fld id="{0FCFF65A-1B82-EC42-8471-385BCA80589D}" type="datetimeFigureOut">
               <a:rPr lang="en-US" smtClean="0"/>
-              <a:t>4/30/18</a:t>
+              <a:t>5/2/18</a:t>
             </a:fld>
             <a:endParaRPr lang="en-US"/>
           </a:p>
@@ -605,7 +605,7 @@
           <a:p>
             <a:fld id="{0FCFF65A-1B82-EC42-8471-385BCA80589D}" type="datetimeFigureOut">
               <a:rPr lang="en-US" smtClean="0"/>
-              <a:t>4/30/18</a:t>
+              <a:t>5/2/18</a:t>
             </a:fld>
             <a:endParaRPr lang="en-US"/>
           </a:p>
@@ -773,7 +773,7 @@
           <a:p>
             <a:fld id="{0FCFF65A-1B82-EC42-8471-385BCA80589D}" type="datetimeFigureOut">
               <a:rPr lang="en-US" smtClean="0"/>
-              <a:t>4/30/18</a:t>
+              <a:t>5/2/18</a:t>
             </a:fld>
             <a:endParaRPr lang="en-US"/>
           </a:p>
@@ -1018,7 +1018,7 @@
           <a:p>
             <a:fld id="{0FCFF65A-1B82-EC42-8471-385BCA80589D}" type="datetimeFigureOut">
               <a:rPr lang="en-US" smtClean="0"/>
-              <a:t>4/30/18</a:t>
+              <a:t>5/2/18</a:t>
             </a:fld>
             <a:endParaRPr lang="en-US"/>
           </a:p>
@@ -1247,7 +1247,7 @@
           <a:p>
             <a:fld id="{0FCFF65A-1B82-EC42-8471-385BCA80589D}" type="datetimeFigureOut">
               <a:rPr lang="en-US" smtClean="0"/>
-              <a:t>4/30/18</a:t>
+              <a:t>5/2/18</a:t>
             </a:fld>
             <a:endParaRPr lang="en-US"/>
           </a:p>
@@ -1611,7 +1611,7 @@
           <a:p>
             <a:fld id="{0FCFF65A-1B82-EC42-8471-385BCA80589D}" type="datetimeFigureOut">
               <a:rPr lang="en-US" smtClean="0"/>
-              <a:t>4/30/18</a:t>
+              <a:t>5/2/18</a:t>
             </a:fld>
             <a:endParaRPr lang="en-US"/>
           </a:p>
@@ -1728,7 +1728,7 @@
           <a:p>
             <a:fld id="{0FCFF65A-1B82-EC42-8471-385BCA80589D}" type="datetimeFigureOut">
               <a:rPr lang="en-US" smtClean="0"/>
-              <a:t>4/30/18</a:t>
+              <a:t>5/2/18</a:t>
             </a:fld>
             <a:endParaRPr lang="en-US"/>
           </a:p>
@@ -1823,7 +1823,7 @@
           <a:p>
             <a:fld id="{0FCFF65A-1B82-EC42-8471-385BCA80589D}" type="datetimeFigureOut">
               <a:rPr lang="en-US" smtClean="0"/>
-              <a:t>4/30/18</a:t>
+              <a:t>5/2/18</a:t>
             </a:fld>
             <a:endParaRPr lang="en-US"/>
           </a:p>
@@ -2098,7 +2098,7 @@
           <a:p>
             <a:fld id="{0FCFF65A-1B82-EC42-8471-385BCA80589D}" type="datetimeFigureOut">
               <a:rPr lang="en-US" smtClean="0"/>
-              <a:t>4/30/18</a:t>
+              <a:t>5/2/18</a:t>
             </a:fld>
             <a:endParaRPr lang="en-US"/>
           </a:p>
@@ -2350,7 +2350,7 @@
           <a:p>
             <a:fld id="{0FCFF65A-1B82-EC42-8471-385BCA80589D}" type="datetimeFigureOut">
               <a:rPr lang="en-US" smtClean="0"/>
-              <a:t>4/30/18</a:t>
+              <a:t>5/2/18</a:t>
             </a:fld>
             <a:endParaRPr lang="en-US"/>
           </a:p>
@@ -2561,7 +2561,7 @@
           <a:p>
             <a:fld id="{0FCFF65A-1B82-EC42-8471-385BCA80589D}" type="datetimeFigureOut">
               <a:rPr lang="en-US" smtClean="0"/>
-              <a:t>4/30/18</a:t>
+              <a:t>5/2/18</a:t>
             </a:fld>
             <a:endParaRPr lang="en-US"/>
           </a:p>
@@ -4261,7 +4261,7 @@
         <p:spPr/>
         <p:txBody>
           <a:bodyPr>
-            <a:normAutofit/>
+            <a:normAutofit lnSpcReduction="10000"/>
           </a:bodyPr>
           <a:lstStyle/>
           <a:p>
@@ -4383,10 +4383,25 @@
               </a:rPr>
               <a:t>https://protodave.com/security/checking-your-dkim-dns-record/</a:t>
             </a:r>
-            <a:r>
-              <a:rPr lang="en-US" dirty="0"/>
-              <a:t>  </a:t>
-            </a:r>
+            <a:endParaRPr lang="en-US" dirty="0"/>
+          </a:p>
+          <a:p>
+            <a:pPr lvl="1"/>
+            <a:r>
+              <a:rPr lang="en-US" dirty="0"/>
+              <a:t>DANE: </a:t>
+            </a:r>
+            <a:r>
+              <a:rPr lang="en-US" dirty="0">
+                <a:hlinkClick r:id="rId9"/>
+              </a:rPr>
+              <a:t>https://en.wikipedia.org/wiki/DNS-based_Authentication_of_Named_Entities</a:t>
+            </a:r>
+            <a:r>
+              <a:rPr lang="en-US"/>
+              <a:t>   </a:t>
+            </a:r>
+            <a:endParaRPr lang="en-US" dirty="0"/>
           </a:p>
         </p:txBody>
       </p:sp>
@@ -5501,20 +5516,53 @@
         </p:nvSpPr>
         <p:spPr/>
         <p:txBody>
-          <a:bodyPr/>
-          <a:lstStyle/>
-          <a:p>
-            <a:r>
-              <a:rPr lang="en-US" dirty="0"/>
-              <a:t>DNS-based Authentication of </a:t>
-            </a:r>
-            <a:r>
-              <a:rPr lang="en-US"/>
-              <a:t>Named Entities</a:t>
-            </a:r>
-          </a:p>
-          <a:p>
-            <a:endParaRPr lang="en-US"/>
+          <a:bodyPr>
+            <a:normAutofit fontScale="92500" lnSpcReduction="10000"/>
+          </a:bodyPr>
+          <a:lstStyle/>
+          <a:p>
+            <a:r>
+              <a:rPr lang="en-US" dirty="0"/>
+              <a:t>DNS-based Authentication of Named Entities</a:t>
+            </a:r>
+          </a:p>
+          <a:p>
+            <a:r>
+              <a:rPr lang="en-US" dirty="0"/>
+              <a:t>Described in RFC 6698 and proposed as  way to authenticated TLS certificates to be bound to DNS using DNSSEC</a:t>
+            </a:r>
+          </a:p>
+          <a:p>
+            <a:r>
+              <a:rPr lang="en-US" dirty="0"/>
+              <a:t>Having a DANE Record indicates that a sender of an email must use encryption (TLS) to transmit the email from the sending server to the recipient email</a:t>
+            </a:r>
+          </a:p>
+          <a:p>
+            <a:r>
+              <a:rPr lang="en-US" dirty="0"/>
+              <a:t>Using DANE therefore will ensure that the email sent to you was transmitted over TLS (encrypted) and so that much more difficult for a snoop to read your email</a:t>
+            </a:r>
+          </a:p>
+          <a:p>
+            <a:r>
+              <a:rPr lang="en-US" dirty="0"/>
+              <a:t>Without DANE, email uses opportunistic encryption to secure SMTP – </a:t>
+            </a:r>
+            <a:r>
+              <a:rPr lang="en-US" dirty="0" err="1"/>
+              <a:t>ie</a:t>
+            </a:r>
+            <a:r>
+              <a:rPr lang="en-US" dirty="0"/>
+              <a:t> it will be used if available</a:t>
+            </a:r>
+          </a:p>
+          <a:p>
+            <a:endParaRPr lang="en-US" dirty="0"/>
+          </a:p>
+          <a:p>
+            <a:endParaRPr lang="en-US" dirty="0"/>
           </a:p>
         </p:txBody>
       </p:sp>

</xml_diff>